<commit_message>
Accidentally broke intersections, fixed it
</commit_message>
<xml_diff>
--- a/presentation/Presentation.pptx
+++ b/presentation/Presentation.pptx
@@ -5,10 +5,10 @@
     <p:sldMasterId id="2147483648" r:id="rId1"/>
   </p:sldMasterIdLst>
   <p:notesMasterIdLst>
-    <p:notesMasterId r:id="rId25"/>
+    <p:notesMasterId r:id="rId27"/>
   </p:notesMasterIdLst>
   <p:handoutMasterIdLst>
-    <p:handoutMasterId r:id="rId26"/>
+    <p:handoutMasterId r:id="rId28"/>
   </p:handoutMasterIdLst>
   <p:sldIdLst>
     <p:sldId id="273" r:id="rId2"/>
@@ -33,7 +33,9 @@
     <p:sldId id="312" r:id="rId21"/>
     <p:sldId id="313" r:id="rId22"/>
     <p:sldId id="282" r:id="rId23"/>
-    <p:sldId id="283" r:id="rId24"/>
+    <p:sldId id="314" r:id="rId24"/>
+    <p:sldId id="283" r:id="rId25"/>
+    <p:sldId id="315" r:id="rId26"/>
   </p:sldIdLst>
   <p:sldSz cx="9144000" cy="6858000" type="screen4x3"/>
   <p:notesSz cx="6858000" cy="9144000"/>
@@ -189,7 +191,9 @@
             <p14:sldId id="312"/>
             <p14:sldId id="313"/>
             <p14:sldId id="282"/>
+            <p14:sldId id="314"/>
             <p14:sldId id="283"/>
+            <p14:sldId id="315"/>
           </p14:sldIdLst>
         </p14:section>
       </p14:sectionLst>
@@ -10214,6 +10218,534 @@
       </p:grpSpPr>
       <p:sp>
         <p:nvSpPr>
+          <p:cNvPr id="5" name="Titel 4"/>
+          <p:cNvSpPr>
+            <a:spLocks noGrp="1"/>
+          </p:cNvSpPr>
+          <p:nvPr>
+            <p:ph type="title"/>
+          </p:nvPr>
+        </p:nvSpPr>
+        <p:spPr/>
+        <p:txBody>
+          <a:bodyPr/>
+          <a:lstStyle/>
+          <a:p>
+            <a:r>
+              <a:rPr lang="de-DE" dirty="0" err="1" smtClean="0"/>
+              <a:t>Construction</a:t>
+            </a:r>
+            <a:endParaRPr lang="de-DE" dirty="0"/>
+          </a:p>
+        </p:txBody>
+      </p:sp>
+      <mc:AlternateContent xmlns:mc="http://schemas.openxmlformats.org/markup-compatibility/2006">
+        <mc:Choice xmlns:a14="http://schemas.microsoft.com/office/drawing/2010/main" Requires="a14">
+          <p:sp>
+            <p:nvSpPr>
+              <p:cNvPr id="6" name="Inhaltsplatzhalter 5"/>
+              <p:cNvSpPr>
+                <a:spLocks noGrp="1"/>
+              </p:cNvSpPr>
+              <p:nvPr>
+                <p:ph idx="1"/>
+              </p:nvPr>
+            </p:nvSpPr>
+            <p:spPr/>
+            <p:txBody>
+              <a:bodyPr>
+                <a:normAutofit/>
+              </a:bodyPr>
+              <a:lstStyle/>
+              <a:p>
+                <a:r>
+                  <a:rPr lang="de-DE" dirty="0" smtClean="0"/>
+                  <a:t>Given a </a:t>
+                </a:r>
+                <a:r>
+                  <a:rPr lang="de-DE" dirty="0" err="1" smtClean="0"/>
+                  <a:t>list</a:t>
+                </a:r>
+                <a:r>
+                  <a:rPr lang="de-DE" dirty="0" smtClean="0"/>
+                  <a:t> </a:t>
+                </a:r>
+                <a:r>
+                  <a:rPr lang="de-DE" dirty="0" err="1" smtClean="0"/>
+                  <a:t>of</a:t>
+                </a:r>
+                <a:r>
+                  <a:rPr lang="de-DE" dirty="0" smtClean="0"/>
+                  <a:t> </a:t>
+                </a:r>
+                <a:r>
+                  <a:rPr lang="de-DE" dirty="0" err="1" smtClean="0"/>
+                  <a:t>polygons</a:t>
+                </a:r>
+                <a:r>
+                  <a:rPr lang="de-DE" dirty="0" smtClean="0"/>
+                  <a:t>, </a:t>
+                </a:r>
+                <a:r>
+                  <a:rPr lang="de-DE" dirty="0" err="1" smtClean="0"/>
+                  <a:t>build</a:t>
+                </a:r>
+                <a:r>
+                  <a:rPr lang="de-DE" dirty="0" smtClean="0"/>
+                  <a:t> a </a:t>
+                </a:r>
+                <a:r>
+                  <a:rPr lang="de-DE" i="1" dirty="0" err="1" smtClean="0"/>
+                  <a:t>kd</a:t>
+                </a:r>
+                <a:r>
+                  <a:rPr lang="de-DE" dirty="0" err="1" smtClean="0"/>
+                  <a:t>-tree</a:t>
+                </a:r>
+                <a:r>
+                  <a:rPr lang="de-DE" dirty="0" smtClean="0"/>
+                  <a:t> such </a:t>
+                </a:r>
+                <a:r>
+                  <a:rPr lang="de-DE" dirty="0" err="1" smtClean="0"/>
+                  <a:t>that</a:t>
+                </a:r>
+                <a:r>
+                  <a:rPr lang="de-DE" dirty="0" smtClean="0"/>
+                  <a:t> </a:t>
+                </a:r>
+                <a:r>
+                  <a:rPr lang="de-DE" dirty="0" err="1" smtClean="0"/>
+                  <a:t>average</a:t>
+                </a:r>
+                <a:r>
+                  <a:rPr lang="de-DE" dirty="0" smtClean="0"/>
+                  <a:t> </a:t>
+                </a:r>
+                <a:r>
+                  <a:rPr lang="de-DE" dirty="0" err="1" smtClean="0"/>
+                  <a:t>query</a:t>
+                </a:r>
+                <a:r>
+                  <a:rPr lang="de-DE" dirty="0" smtClean="0"/>
+                  <a:t> time </a:t>
+                </a:r>
+                <a:r>
+                  <a:rPr lang="de-DE" dirty="0" err="1" smtClean="0"/>
+                  <a:t>is</a:t>
+                </a:r>
+                <a:r>
+                  <a:rPr lang="de-DE" dirty="0" smtClean="0"/>
+                  <a:t> </a:t>
+                </a:r>
+                <a:r>
+                  <a:rPr lang="de-DE" dirty="0" err="1" smtClean="0"/>
+                  <a:t>low</a:t>
+                </a:r>
+                <a:endParaRPr lang="de-DE" dirty="0" smtClean="0"/>
+              </a:p>
+              <a:p>
+                <a:r>
+                  <a:rPr lang="de-DE" dirty="0" smtClean="0"/>
+                  <a:t>Different </a:t>
+                </a:r>
+                <a:r>
+                  <a:rPr lang="de-DE" dirty="0" err="1" smtClean="0"/>
+                  <a:t>heuristics</a:t>
+                </a:r>
+                <a:endParaRPr lang="de-DE" dirty="0"/>
+              </a:p>
+              <a:p>
+                <a:pPr lvl="1"/>
+                <a:r>
+                  <a:rPr lang="de-DE" dirty="0" err="1" smtClean="0"/>
+                  <a:t>Spatial</a:t>
+                </a:r>
+                <a:r>
+                  <a:rPr lang="de-DE" dirty="0" smtClean="0"/>
+                  <a:t> median</a:t>
+                </a:r>
+              </a:p>
+              <a:p>
+                <a:pPr lvl="1"/>
+                <a:r>
+                  <a:rPr lang="de-DE" dirty="0" err="1" smtClean="0"/>
+                  <a:t>Object</a:t>
+                </a:r>
+                <a:r>
+                  <a:rPr lang="de-DE" dirty="0" smtClean="0"/>
+                  <a:t> median</a:t>
+                </a:r>
+              </a:p>
+              <a:p>
+                <a:pPr lvl="1"/>
+                <a:r>
+                  <a:rPr lang="de-DE" dirty="0" err="1" smtClean="0"/>
+                  <a:t>Cost</a:t>
+                </a:r>
+                <a:r>
+                  <a:rPr lang="de-DE" dirty="0" smtClean="0"/>
+                  <a:t> </a:t>
+                </a:r>
+                <a:r>
+                  <a:rPr lang="de-DE" dirty="0" err="1" smtClean="0"/>
+                  <a:t>function</a:t>
+                </a:r>
+                <a:r>
+                  <a:rPr lang="de-DE" dirty="0" smtClean="0"/>
+                  <a:t> (Surface Area </a:t>
+                </a:r>
+                <a:r>
+                  <a:rPr lang="de-DE" dirty="0" err="1" smtClean="0"/>
+                  <a:t>Heuristic</a:t>
+                </a:r>
+                <a:r>
+                  <a:rPr lang="de-DE" dirty="0" smtClean="0"/>
+                  <a:t>)</a:t>
+                </a:r>
+              </a:p>
+              <a:p>
+                <a:r>
+                  <a:rPr lang="de-DE" dirty="0" err="1" smtClean="0"/>
+                  <a:t>Implemented</a:t>
+                </a:r>
+                <a:r>
+                  <a:rPr lang="de-DE" dirty="0" smtClean="0"/>
+                  <a:t> </a:t>
+                </a:r>
+                <a:r>
+                  <a:rPr lang="de-DE" i="1" dirty="0" err="1" smtClean="0"/>
+                  <a:t>kd</a:t>
+                </a:r>
+                <a:r>
+                  <a:rPr lang="de-DE" dirty="0" err="1" smtClean="0"/>
+                  <a:t>-tree</a:t>
+                </a:r>
+                <a:r>
+                  <a:rPr lang="de-DE" dirty="0" smtClean="0"/>
+                  <a:t> </a:t>
+                </a:r>
+                <a:r>
+                  <a:rPr lang="de-DE" dirty="0" err="1" smtClean="0"/>
+                  <a:t>construction</a:t>
+                </a:r>
+                <a:r>
+                  <a:rPr lang="de-DE" dirty="0" smtClean="0"/>
+                  <a:t> </a:t>
+                </a:r>
+                <a:r>
+                  <a:rPr lang="de-DE" dirty="0" err="1" smtClean="0"/>
+                  <a:t>based</a:t>
+                </a:r>
+                <a:r>
+                  <a:rPr lang="de-DE" dirty="0" smtClean="0"/>
+                  <a:t> on Surface Area </a:t>
+                </a:r>
+                <a:r>
+                  <a:rPr lang="de-DE" dirty="0" err="1" smtClean="0"/>
+                  <a:t>Heuristic</a:t>
+                </a:r>
+                <a:endParaRPr lang="de-DE" dirty="0" smtClean="0"/>
+              </a:p>
+              <a:p>
+                <a:r>
+                  <a:rPr lang="de-DE" dirty="0" err="1" smtClean="0"/>
+                  <a:t>Based</a:t>
+                </a:r>
+                <a:r>
+                  <a:rPr lang="de-DE" dirty="0" smtClean="0"/>
+                  <a:t> on </a:t>
+                </a:r>
+                <a:r>
+                  <a:rPr lang="de-DE" dirty="0" err="1" smtClean="0"/>
+                  <a:t>the</a:t>
+                </a:r>
+                <a:r>
+                  <a:rPr lang="de-DE" dirty="0" smtClean="0"/>
+                  <a:t> </a:t>
+                </a:r>
+                <a14:m>
+                  <m:oMath xmlns:m="http://schemas.openxmlformats.org/officeDocument/2006/math">
+                    <m:r>
+                      <a:rPr lang="en-US" i="1" dirty="0">
+                        <a:latin typeface="Cambria Math" panose="02040503050406030204" pitchFamily="18" charset="0"/>
+                      </a:rPr>
+                      <m:t>𝑂</m:t>
+                    </m:r>
+                    <m:d>
+                      <m:dPr>
+                        <m:ctrlPr>
+                          <a:rPr lang="en-US" i="1" dirty="0">
+                            <a:latin typeface="Cambria Math" panose="02040503050406030204" pitchFamily="18" charset="0"/>
+                          </a:rPr>
+                        </m:ctrlPr>
+                      </m:dPr>
+                      <m:e>
+                        <m:r>
+                          <a:rPr lang="de-DE" i="1" dirty="0">
+                            <a:latin typeface="Cambria Math" panose="02040503050406030204" pitchFamily="18" charset="0"/>
+                          </a:rPr>
+                          <m:t>𝑛</m:t>
+                        </m:r>
+                        <m:r>
+                          <a:rPr lang="de-DE" i="1" dirty="0">
+                            <a:latin typeface="Cambria Math" panose="02040503050406030204" pitchFamily="18" charset="0"/>
+                          </a:rPr>
+                          <m:t> </m:t>
+                        </m:r>
+                        <m:sSup>
+                          <m:sSupPr>
+                            <m:ctrlPr>
+                              <a:rPr lang="de-DE" i="1" dirty="0" smtClean="0">
+                                <a:latin typeface="Cambria Math" panose="02040503050406030204" pitchFamily="18" charset="0"/>
+                              </a:rPr>
+                            </m:ctrlPr>
+                          </m:sSupPr>
+                          <m:e>
+                            <m:r>
+                              <m:rPr>
+                                <m:sty m:val="p"/>
+                              </m:rPr>
+                              <a:rPr lang="en-US" i="1" dirty="0">
+                                <a:latin typeface="Cambria Math" panose="02040503050406030204" pitchFamily="18" charset="0"/>
+                              </a:rPr>
+                              <m:t>log</m:t>
+                            </m:r>
+                          </m:e>
+                          <m:sup>
+                            <m:r>
+                              <a:rPr lang="de-DE" b="0" i="1" dirty="0" smtClean="0">
+                                <a:latin typeface="Cambria Math" panose="02040503050406030204" pitchFamily="18" charset="0"/>
+                              </a:rPr>
+                              <m:t>2</m:t>
+                            </m:r>
+                          </m:sup>
+                        </m:sSup>
+                        <m:r>
+                          <a:rPr lang="en-US" i="1" dirty="0">
+                            <a:latin typeface="Cambria Math" panose="02040503050406030204" pitchFamily="18" charset="0"/>
+                          </a:rPr>
+                          <m:t>𝑛</m:t>
+                        </m:r>
+                      </m:e>
+                    </m:d>
+                  </m:oMath>
+                </a14:m>
+                <a:r>
+                  <a:rPr lang="de-DE" dirty="0" smtClean="0"/>
+                  <a:t> </a:t>
+                </a:r>
+                <a:r>
+                  <a:rPr lang="de-DE" dirty="0" err="1" smtClean="0"/>
+                  <a:t>approach</a:t>
+                </a:r>
+                <a:r>
+                  <a:rPr lang="de-DE" dirty="0" smtClean="0"/>
+                  <a:t> in [1]</a:t>
+                </a:r>
+              </a:p>
+              <a:p>
+                <a:pPr lvl="1"/>
+                <a:r>
+                  <a:rPr lang="de-DE" dirty="0" smtClean="0"/>
+                  <a:t>Paper also </a:t>
+                </a:r>
+                <a:r>
+                  <a:rPr lang="de-DE" dirty="0" err="1" smtClean="0"/>
+                  <a:t>describes</a:t>
+                </a:r>
+                <a:r>
+                  <a:rPr lang="de-DE" dirty="0" smtClean="0"/>
+                  <a:t> </a:t>
+                </a:r>
+                <a14:m>
+                  <m:oMath xmlns:m="http://schemas.openxmlformats.org/officeDocument/2006/math">
+                    <m:r>
+                      <a:rPr lang="en-US" i="1" dirty="0">
+                        <a:latin typeface="Cambria Math" panose="02040503050406030204" pitchFamily="18" charset="0"/>
+                      </a:rPr>
+                      <m:t>𝑂</m:t>
+                    </m:r>
+                    <m:d>
+                      <m:dPr>
+                        <m:ctrlPr>
+                          <a:rPr lang="en-US" i="1" dirty="0">
+                            <a:latin typeface="Cambria Math" panose="02040503050406030204" pitchFamily="18" charset="0"/>
+                          </a:rPr>
+                        </m:ctrlPr>
+                      </m:dPr>
+                      <m:e>
+                        <m:r>
+                          <a:rPr lang="de-DE" i="1" dirty="0">
+                            <a:latin typeface="Cambria Math" panose="02040503050406030204" pitchFamily="18" charset="0"/>
+                          </a:rPr>
+                          <m:t>𝑛</m:t>
+                        </m:r>
+                        <m:r>
+                          <a:rPr lang="de-DE" b="0" i="1" dirty="0" smtClean="0">
+                            <a:latin typeface="Cambria Math" panose="02040503050406030204" pitchFamily="18" charset="0"/>
+                          </a:rPr>
+                          <m:t> </m:t>
+                        </m:r>
+                        <m:r>
+                          <m:rPr>
+                            <m:sty m:val="p"/>
+                          </m:rPr>
+                          <a:rPr lang="en-US" i="1" dirty="0">
+                            <a:latin typeface="Cambria Math" panose="02040503050406030204" pitchFamily="18" charset="0"/>
+                          </a:rPr>
+                          <m:t>log</m:t>
+                        </m:r>
+                        <m:r>
+                          <a:rPr lang="de-DE" b="0" i="1" dirty="0" smtClean="0">
+                            <a:latin typeface="Cambria Math" panose="02040503050406030204" pitchFamily="18" charset="0"/>
+                          </a:rPr>
+                          <m:t> </m:t>
+                        </m:r>
+                        <m:r>
+                          <a:rPr lang="en-US" i="1" dirty="0">
+                            <a:latin typeface="Cambria Math" panose="02040503050406030204" pitchFamily="18" charset="0"/>
+                          </a:rPr>
+                          <m:t>𝑛</m:t>
+                        </m:r>
+                      </m:e>
+                    </m:d>
+                  </m:oMath>
+                </a14:m>
+                <a:r>
+                  <a:rPr lang="de-DE" dirty="0" smtClean="0"/>
+                  <a:t> algorithm</a:t>
+                </a:r>
+              </a:p>
+              <a:p>
+                <a:endParaRPr lang="de-DE" dirty="0" smtClean="0"/>
+              </a:p>
+              <a:p>
+                <a:pPr lvl="1"/>
+                <a:endParaRPr lang="de-DE" dirty="0"/>
+              </a:p>
+              <a:p>
+                <a:pPr marL="418388" indent="-457200">
+                  <a:buFont typeface="+mj-lt"/>
+                  <a:buAutoNum type="arabicPeriod"/>
+                </a:pPr>
+                <a:endParaRPr lang="de-DE" dirty="0" smtClean="0"/>
+              </a:p>
+            </p:txBody>
+          </p:sp>
+        </mc:Choice>
+        <mc:Fallback>
+          <p:sp>
+            <p:nvSpPr>
+              <p:cNvPr id="6" name="Inhaltsplatzhalter 5"/>
+              <p:cNvSpPr>
+                <a:spLocks noGrp="1" noRot="1" noChangeAspect="1" noMove="1" noResize="1" noEditPoints="1" noAdjustHandles="1" noChangeArrowheads="1" noChangeShapeType="1" noTextEdit="1"/>
+              </p:cNvSpPr>
+              <p:nvPr>
+                <p:ph idx="1"/>
+              </p:nvPr>
+            </p:nvSpPr>
+            <p:spPr>
+              <a:blipFill>
+                <a:blip r:embed="rId2"/>
+                <a:stretch>
+                  <a:fillRect t="-2329" b="-2587"/>
+                </a:stretch>
+              </a:blipFill>
+            </p:spPr>
+            <p:txBody>
+              <a:bodyPr/>
+              <a:lstStyle/>
+              <a:p>
+                <a:r>
+                  <a:rPr lang="de-DE">
+                    <a:noFill/>
+                  </a:rPr>
+                  <a:t> </a:t>
+                </a:r>
+              </a:p>
+            </p:txBody>
+          </p:sp>
+        </mc:Fallback>
+      </mc:AlternateContent>
+      <p:sp>
+        <p:nvSpPr>
+          <p:cNvPr id="4" name="Fußzeilenplatzhalter 3"/>
+          <p:cNvSpPr>
+            <a:spLocks noGrp="1"/>
+          </p:cNvSpPr>
+          <p:nvPr>
+            <p:ph type="ftr" sz="quarter" idx="10"/>
+          </p:nvPr>
+        </p:nvSpPr>
+        <p:spPr/>
+        <p:txBody>
+          <a:bodyPr/>
+          <a:lstStyle/>
+          <a:p>
+            <a:pPr>
+              <a:defRPr/>
+            </a:pPr>
+            <a:r>
+              <a:rPr lang="de-DE" dirty="0"/>
+              <a:t>Mao L., Wang C., Sebastian G. – </a:t>
+            </a:r>
+            <a:r>
+              <a:rPr lang="de-DE" dirty="0" err="1"/>
+              <a:t>Ghosts</a:t>
+            </a:r>
+            <a:r>
+              <a:rPr lang="de-DE" dirty="0"/>
+              <a:t> </a:t>
+            </a:r>
+            <a:r>
+              <a:rPr lang="de-DE" dirty="0" err="1"/>
+              <a:t>activate</a:t>
+            </a:r>
+            <a:r>
+              <a:rPr lang="de-DE" dirty="0"/>
+              <a:t> on </a:t>
+            </a:r>
+            <a:r>
+              <a:rPr lang="de-DE" dirty="0" err="1"/>
+              <a:t>sight</a:t>
+            </a:r>
+            <a:endParaRPr lang="en-US" dirty="0"/>
+          </a:p>
+        </p:txBody>
+      </p:sp>
+    </p:spTree>
+    <p:extLst>
+      <p:ext uri="{BB962C8B-B14F-4D97-AF65-F5344CB8AC3E}">
+        <p14:creationId xmlns:p14="http://schemas.microsoft.com/office/powerpoint/2010/main" val="2653859549"/>
+      </p:ext>
+    </p:extLst>
+  </p:cSld>
+  <p:clrMapOvr>
+    <a:masterClrMapping/>
+  </p:clrMapOvr>
+</p:sld>
+</file>
+
+<file path=ppt/slides/slide24.xml><?xml version="1.0" encoding="utf-8"?>
+<p:sld xmlns:a="http://schemas.openxmlformats.org/drawingml/2006/main" xmlns:r="http://schemas.openxmlformats.org/officeDocument/2006/relationships" xmlns:p="http://schemas.openxmlformats.org/presentationml/2006/main">
+  <p:cSld>
+    <p:spTree>
+      <p:nvGrpSpPr>
+        <p:cNvPr id="1" name=""/>
+        <p:cNvGrpSpPr/>
+        <p:nvPr/>
+      </p:nvGrpSpPr>
+      <p:grpSpPr>
+        <a:xfrm>
+          <a:off x="0" y="0"/>
+          <a:ext cx="0" cy="0"/>
+          <a:chOff x="0" y="0"/>
+          <a:chExt cx="0" cy="0"/>
+        </a:xfrm>
+      </p:grpSpPr>
+      <p:sp>
+        <p:nvSpPr>
           <p:cNvPr id="3" name="Textplatzhalter 2"/>
           <p:cNvSpPr>
             <a:spLocks noGrp="1"/>
@@ -10304,6 +10836,189 @@
     <p:extLst>
       <p:ext uri="{BB962C8B-B14F-4D97-AF65-F5344CB8AC3E}">
         <p14:creationId xmlns:p14="http://schemas.microsoft.com/office/powerpoint/2010/main" val="528723072"/>
+      </p:ext>
+    </p:extLst>
+  </p:cSld>
+  <p:clrMapOvr>
+    <a:masterClrMapping/>
+  </p:clrMapOvr>
+</p:sld>
+</file>
+
+<file path=ppt/slides/slide25.xml><?xml version="1.0" encoding="utf-8"?>
+<p:sld xmlns:a="http://schemas.openxmlformats.org/drawingml/2006/main" xmlns:r="http://schemas.openxmlformats.org/officeDocument/2006/relationships" xmlns:p="http://schemas.openxmlformats.org/presentationml/2006/main">
+  <p:cSld>
+    <p:spTree>
+      <p:nvGrpSpPr>
+        <p:cNvPr id="1" name=""/>
+        <p:cNvGrpSpPr/>
+        <p:nvPr/>
+      </p:nvGrpSpPr>
+      <p:grpSpPr>
+        <a:xfrm>
+          <a:off x="0" y="0"/>
+          <a:ext cx="0" cy="0"/>
+          <a:chOff x="0" y="0"/>
+          <a:chExt cx="0" cy="0"/>
+        </a:xfrm>
+      </p:grpSpPr>
+      <p:sp>
+        <p:nvSpPr>
+          <p:cNvPr id="5" name="Titel 4"/>
+          <p:cNvSpPr>
+            <a:spLocks noGrp="1"/>
+          </p:cNvSpPr>
+          <p:nvPr>
+            <p:ph type="title"/>
+          </p:nvPr>
+        </p:nvSpPr>
+        <p:spPr/>
+        <p:txBody>
+          <a:bodyPr/>
+          <a:lstStyle/>
+          <a:p>
+            <a:r>
+              <a:rPr lang="de-DE" dirty="0" smtClean="0"/>
+              <a:t>References</a:t>
+            </a:r>
+            <a:endParaRPr lang="de-DE" dirty="0"/>
+          </a:p>
+        </p:txBody>
+      </p:sp>
+      <p:sp>
+        <p:nvSpPr>
+          <p:cNvPr id="6" name="Inhaltsplatzhalter 5"/>
+          <p:cNvSpPr>
+            <a:spLocks noGrp="1"/>
+          </p:cNvSpPr>
+          <p:nvPr>
+            <p:ph idx="1"/>
+          </p:nvPr>
+        </p:nvSpPr>
+        <p:spPr/>
+        <p:txBody>
+          <a:bodyPr>
+            <a:normAutofit/>
+          </a:bodyPr>
+          <a:lstStyle/>
+          <a:p>
+            <a:r>
+              <a:rPr lang="de-DE" dirty="0"/>
+              <a:t>[1] </a:t>
+            </a:r>
+            <a:r>
+              <a:rPr lang="en-US" dirty="0">
+                <a:hlinkClick r:id="rId2"/>
+              </a:rPr>
+              <a:t>On building fast </a:t>
+            </a:r>
+            <a:r>
+              <a:rPr lang="en-US" dirty="0" err="1">
+                <a:hlinkClick r:id="rId2"/>
+              </a:rPr>
+              <a:t>kd</a:t>
+            </a:r>
+            <a:r>
+              <a:rPr lang="en-US" dirty="0">
+                <a:hlinkClick r:id="rId2"/>
+              </a:rPr>
+              <a:t>-Trees for Ray Tracing, and on doing that in O(N log N) (2006</a:t>
+            </a:r>
+            <a:r>
+              <a:rPr lang="en-US" dirty="0" smtClean="0">
+                <a:hlinkClick r:id="rId2"/>
+              </a:rPr>
+              <a:t>),</a:t>
+            </a:r>
+            <a:r>
+              <a:rPr lang="de-DE" dirty="0">
+                <a:hlinkClick r:id="rId2"/>
+              </a:rPr>
+              <a:t> </a:t>
+            </a:r>
+            <a:r>
+              <a:rPr lang="de-DE" dirty="0" smtClean="0">
+                <a:hlinkClick r:id="rId2"/>
+              </a:rPr>
+              <a:t>Ingo Wald, </a:t>
+            </a:r>
+            <a:r>
+              <a:rPr lang="de-DE" dirty="0">
+                <a:hlinkClick r:id="rId2"/>
+              </a:rPr>
+              <a:t>Vlastimil </a:t>
+            </a:r>
+            <a:r>
+              <a:rPr lang="de-DE" dirty="0" err="1">
+                <a:hlinkClick r:id="rId2"/>
+              </a:rPr>
+              <a:t>Havran</a:t>
+            </a:r>
+            <a:endParaRPr lang="de-DE" dirty="0" smtClean="0"/>
+          </a:p>
+          <a:p>
+            <a:pPr lvl="1"/>
+            <a:endParaRPr lang="de-DE" dirty="0"/>
+          </a:p>
+          <a:p>
+            <a:pPr marL="418388" indent="-457200">
+              <a:buFont typeface="+mj-lt"/>
+              <a:buAutoNum type="arabicPeriod"/>
+            </a:pPr>
+            <a:endParaRPr lang="de-DE" dirty="0" smtClean="0"/>
+          </a:p>
+        </p:txBody>
+      </p:sp>
+      <p:sp>
+        <p:nvSpPr>
+          <p:cNvPr id="4" name="Fußzeilenplatzhalter 3"/>
+          <p:cNvSpPr>
+            <a:spLocks noGrp="1"/>
+          </p:cNvSpPr>
+          <p:nvPr>
+            <p:ph type="ftr" sz="quarter" idx="10"/>
+          </p:nvPr>
+        </p:nvSpPr>
+        <p:spPr/>
+        <p:txBody>
+          <a:bodyPr/>
+          <a:lstStyle/>
+          <a:p>
+            <a:pPr>
+              <a:defRPr/>
+            </a:pPr>
+            <a:r>
+              <a:rPr lang="de-DE" dirty="0"/>
+              <a:t>Mao L., Wang C., Sebastian G. – </a:t>
+            </a:r>
+            <a:r>
+              <a:rPr lang="de-DE" dirty="0" err="1"/>
+              <a:t>Ghosts</a:t>
+            </a:r>
+            <a:r>
+              <a:rPr lang="de-DE" dirty="0"/>
+              <a:t> </a:t>
+            </a:r>
+            <a:r>
+              <a:rPr lang="de-DE" dirty="0" err="1"/>
+              <a:t>activate</a:t>
+            </a:r>
+            <a:r>
+              <a:rPr lang="de-DE" dirty="0"/>
+              <a:t> on </a:t>
+            </a:r>
+            <a:r>
+              <a:rPr lang="de-DE" dirty="0" err="1"/>
+              <a:t>sight</a:t>
+            </a:r>
+            <a:endParaRPr lang="en-US" dirty="0"/>
+          </a:p>
+        </p:txBody>
+      </p:sp>
+    </p:spTree>
+    <p:extLst>
+      <p:ext uri="{BB962C8B-B14F-4D97-AF65-F5344CB8AC3E}">
+        <p14:creationId xmlns:p14="http://schemas.microsoft.com/office/powerpoint/2010/main" val="520941319"/>
       </p:ext>
     </p:extLst>
   </p:cSld>

</xml_diff>